<commit_message>
Capstone Project submission -2
</commit_message>
<xml_diff>
--- a/Capstone project Presentation.pptx
+++ b/Capstone project Presentation.pptx
@@ -8,10 +8,11 @@
     <p:sldId id="256" r:id="rId2"/>
     <p:sldId id="257" r:id="rId3"/>
     <p:sldId id="258" r:id="rId4"/>
-    <p:sldId id="259" r:id="rId5"/>
-    <p:sldId id="260" r:id="rId6"/>
-    <p:sldId id="261" r:id="rId7"/>
-    <p:sldId id="262" r:id="rId8"/>
+    <p:sldId id="263" r:id="rId5"/>
+    <p:sldId id="259" r:id="rId6"/>
+    <p:sldId id="260" r:id="rId7"/>
+    <p:sldId id="261" r:id="rId8"/>
+    <p:sldId id="262" r:id="rId9"/>
   </p:sldIdLst>
   <p:sldSz cx="12192000" cy="6858000"/>
   <p:notesSz cx="6858000" cy="9144000"/>
@@ -110,6 +111,11 @@
       </a:defRPr>
     </a:lvl9pPr>
   </p:defaultTextStyle>
+  <p:extLst>
+    <p:ext uri="{EFAFB233-063F-42B5-8137-9DF3F51BA10A}">
+      <p15:sldGuideLst xmlns:p15="http://schemas.microsoft.com/office/powerpoint/2012/main"/>
+    </p:ext>
+  </p:extLst>
 </p:presentation>
 </file>
 
@@ -6307,12 +6313,14 @@
         </p:nvSpPr>
         <p:spPr>
           <a:xfrm>
-            <a:off x="834502" y="1518082"/>
-            <a:ext cx="9215352" cy="4730317"/>
-          </a:xfrm>
-        </p:spPr>
-        <p:txBody>
-          <a:bodyPr/>
+            <a:off x="834502" y="1358284"/>
+            <a:ext cx="9215352" cy="5046998"/>
+          </a:xfrm>
+        </p:spPr>
+        <p:txBody>
+          <a:bodyPr>
+            <a:normAutofit fontScale="92500" lnSpcReduction="20000"/>
+          </a:bodyPr>
           <a:lstStyle/>
           <a:p>
             <a:pPr marL="0" indent="0">
@@ -6327,58 +6335,130 @@
             </a:endParaRPr>
           </a:p>
           <a:p>
-            <a:pPr>
-              <a:buFont typeface="Wingdings" panose="05000000000000000000" pitchFamily="2" charset="2"/>
-              <a:buChar char="à"/>
-            </a:pPr>
-            <a:r>
-              <a:rPr lang="en-IN" dirty="0">
-                <a:sym typeface="Wingdings" panose="05000000000000000000" pitchFamily="2" charset="2"/>
-              </a:rPr>
-              <a:t>Mr. John trying to rent a House in </a:t>
-            </a:r>
-            <a:r>
-              <a:rPr lang="en-IN" b="1" dirty="0">
-                <a:sym typeface="Wingdings" panose="05000000000000000000" pitchFamily="2" charset="2"/>
-              </a:rPr>
-              <a:t>Bengaluru, India</a:t>
-            </a:r>
-          </a:p>
-          <a:p>
-            <a:pPr>
-              <a:buFont typeface="Wingdings" panose="05000000000000000000" pitchFamily="2" charset="2"/>
-              <a:buChar char="à"/>
-            </a:pPr>
-            <a:r>
-              <a:rPr lang="en-IN" dirty="0">
-                <a:sym typeface="Wingdings" panose="05000000000000000000" pitchFamily="2" charset="2"/>
-              </a:rPr>
-              <a:t>Has some preferred locations in his mind.</a:t>
-            </a:r>
-          </a:p>
-          <a:p>
-            <a:pPr>
-              <a:buFont typeface="Wingdings" panose="05000000000000000000" pitchFamily="2" charset="2"/>
-              <a:buChar char="à"/>
-            </a:pPr>
-            <a:r>
-              <a:rPr lang="en-IN" dirty="0">
-                <a:sym typeface="Wingdings" panose="05000000000000000000" pitchFamily="2" charset="2"/>
-              </a:rPr>
-              <a:t>He has some requirements to be met in his preferred locations, to rent a house.</a:t>
-            </a:r>
-          </a:p>
-          <a:p>
-            <a:pPr>
-              <a:buFont typeface="Wingdings" panose="05000000000000000000" pitchFamily="2" charset="2"/>
-              <a:buChar char="à"/>
-            </a:pPr>
-            <a:r>
-              <a:rPr lang="en-IN" dirty="0">
-                <a:sym typeface="Wingdings" panose="05000000000000000000" pitchFamily="2" charset="2"/>
-              </a:rPr>
-              <a:t>Not sure where to rent a house !!!</a:t>
-            </a:r>
+            <a:r>
+              <a:rPr lang="en-IN" dirty="0"/>
+              <a:t>Mr. John is re-locating to Bangalore, India along with his family. He is looking for a suitable accommodation for rent. He has 4 preferred locations in Bangalore, which are:</a:t>
+            </a:r>
+            <a:endParaRPr lang="en-IN" sz="1800" dirty="0"/>
+          </a:p>
+          <a:p>
+            <a:pPr lvl="1"/>
+            <a:r>
+              <a:rPr lang="en-IN" dirty="0"/>
+              <a:t>Yelahanka.</a:t>
+            </a:r>
+            <a:endParaRPr lang="en-IN" sz="1600" dirty="0"/>
+          </a:p>
+          <a:p>
+            <a:pPr lvl="1"/>
+            <a:r>
+              <a:rPr lang="en-IN" dirty="0"/>
+              <a:t>White Field.</a:t>
+            </a:r>
+            <a:endParaRPr lang="en-IN" sz="1600" dirty="0"/>
+          </a:p>
+          <a:p>
+            <a:pPr lvl="1"/>
+            <a:r>
+              <a:rPr lang="en-IN" dirty="0"/>
+              <a:t>Banashankari.</a:t>
+            </a:r>
+            <a:endParaRPr lang="en-IN" sz="1600" dirty="0"/>
+          </a:p>
+          <a:p>
+            <a:pPr lvl="1"/>
+            <a:r>
+              <a:rPr lang="en-IN" dirty="0"/>
+              <a:t>Hebbal.</a:t>
+            </a:r>
+            <a:endParaRPr lang="en-IN" sz="1600" dirty="0"/>
+          </a:p>
+          <a:p>
+            <a:r>
+              <a:rPr lang="en-IN" dirty="0"/>
+              <a:t>He is willing to rent a house in any of these 4 locations. Provided, </a:t>
+            </a:r>
+            <a:r>
+              <a:rPr lang="en-IN" b="1" dirty="0"/>
+              <a:t>all</a:t>
+            </a:r>
+            <a:r>
+              <a:rPr lang="en-IN" dirty="0"/>
+              <a:t> the below conditions should be  satisfied. </a:t>
+            </a:r>
+            <a:endParaRPr lang="en-IN" sz="1800" dirty="0"/>
+          </a:p>
+          <a:p>
+            <a:pPr lvl="0"/>
+            <a:r>
+              <a:rPr lang="en-IN" dirty="0"/>
+              <a:t>As he is a Foodie, he is looking for nice </a:t>
+            </a:r>
+            <a:r>
+              <a:rPr lang="en-IN" b="1" dirty="0"/>
+              <a:t>Restaurants.</a:t>
+            </a:r>
+            <a:endParaRPr lang="en-IN" sz="1800" dirty="0"/>
+          </a:p>
+          <a:p>
+            <a:pPr lvl="0"/>
+            <a:r>
+              <a:rPr lang="en-IN" dirty="0"/>
+              <a:t>He needs a departmental </a:t>
+            </a:r>
+            <a:r>
+              <a:rPr lang="en-IN" b="1" dirty="0"/>
+              <a:t>Stores</a:t>
+            </a:r>
+            <a:r>
+              <a:rPr lang="en-IN" dirty="0"/>
+              <a:t> or a Super s.</a:t>
+            </a:r>
+            <a:endParaRPr lang="en-IN" sz="1800" dirty="0"/>
+          </a:p>
+          <a:p>
+            <a:pPr lvl="0"/>
+            <a:r>
+              <a:rPr lang="en-IN" dirty="0"/>
+              <a:t>A Metro/Bus/Train </a:t>
+            </a:r>
+            <a:r>
+              <a:rPr lang="en-IN" b="1" dirty="0"/>
+              <a:t>station</a:t>
+            </a:r>
+            <a:r>
+              <a:rPr lang="en-IN" dirty="0"/>
+              <a:t>.</a:t>
+            </a:r>
+            <a:endParaRPr lang="en-IN" sz="1800" dirty="0"/>
+          </a:p>
+          <a:p>
+            <a:pPr lvl="0"/>
+            <a:r>
+              <a:rPr lang="en-IN" dirty="0"/>
+              <a:t>He needs a </a:t>
+            </a:r>
+            <a:r>
+              <a:rPr lang="en-IN" b="1" dirty="0"/>
+              <a:t>Park</a:t>
+            </a:r>
+            <a:r>
+              <a:rPr lang="en-IN" dirty="0"/>
+              <a:t> in his neighbourhood, for his relaxation.</a:t>
+            </a:r>
+            <a:endParaRPr lang="en-IN" sz="1800" dirty="0"/>
+          </a:p>
+          <a:p>
+            <a:pPr lvl="0"/>
+            <a:r>
+              <a:rPr lang="en-IN" dirty="0"/>
+              <a:t>He is very much interested in workouts, and needs a full equipped </a:t>
+            </a:r>
+            <a:r>
+              <a:rPr lang="en-IN" b="1" dirty="0"/>
+              <a:t>Gym</a:t>
+            </a:r>
+            <a:endParaRPr lang="en-IN" sz="1800" dirty="0"/>
           </a:p>
           <a:p>
             <a:pPr marL="0" indent="0">
@@ -6388,45 +6468,6 @@
           </a:p>
         </p:txBody>
       </p:sp>
-      <p:pic>
-        <p:nvPicPr>
-          <p:cNvPr id="5" name="Picture 4">
-            <a:extLst>
-              <a:ext uri="{FF2B5EF4-FFF2-40B4-BE49-F238E27FC236}">
-                <a16:creationId xmlns:a16="http://schemas.microsoft.com/office/drawing/2014/main" id="{111A33EE-302B-46E0-880F-7E786B2E1BEB}"/>
-              </a:ext>
-            </a:extLst>
-          </p:cNvPr>
-          <p:cNvPicPr>
-            <a:picLocks noChangeAspect="1"/>
-          </p:cNvPicPr>
-          <p:nvPr/>
-        </p:nvPicPr>
-        <p:blipFill>
-          <a:blip r:embed="rId2">
-            <a:extLst>
-              <a:ext uri="{28A0092B-C50C-407E-A947-70E740481C1C}">
-                <a14:useLocalDpi xmlns:a14="http://schemas.microsoft.com/office/drawing/2010/main" val="0"/>
-              </a:ext>
-              <a:ext uri="{837473B0-CC2E-450A-ABE3-18F120FF3D39}">
-                <a1611:picAttrSrcUrl xmlns:a1611="http://schemas.microsoft.com/office/drawing/2016/11/main" r:id="rId3"/>
-              </a:ext>
-            </a:extLst>
-          </a:blip>
-          <a:stretch>
-            <a:fillRect/>
-          </a:stretch>
-        </p:blipFill>
-        <p:spPr>
-          <a:xfrm>
-            <a:off x="1384917" y="3950563"/>
-            <a:ext cx="2201662" cy="1717828"/>
-          </a:xfrm>
-          <a:prstGeom prst="rect">
-            <a:avLst/>
-          </a:prstGeom>
-        </p:spPr>
-      </p:pic>
     </p:spTree>
     <p:extLst>
       <p:ext uri="{BB962C8B-B14F-4D97-AF65-F5344CB8AC3E}">
@@ -6521,47 +6562,29 @@
             </a:pPr>
             <a:r>
               <a:rPr lang="en-IN" dirty="0"/>
-              <a:t>Can we use Data Science Methodologies to help Mr. John find his dream location ?</a:t>
+              <a:t>Data Source:</a:t>
             </a:r>
           </a:p>
           <a:p>
             <a:pPr marL="0" indent="0">
               <a:buNone/>
             </a:pPr>
+            <a:r>
+              <a:rPr lang="en-US" dirty="0"/>
+              <a:t>This project will utilize data from </a:t>
+            </a:r>
+            <a:r>
+              <a:rPr lang="en-US" b="1" dirty="0"/>
+              <a:t>Foursquare </a:t>
+            </a:r>
+            <a:r>
+              <a:rPr lang="en-US" dirty="0"/>
+              <a:t>. Foursquare is a technology company that built a massive dataset of location data. What is interesting about Foursquare is that they were very smart about building their dataset. They actually crowd-sourced their data and had people use their app to build their dataset and add venues and complete any missing information they had in their dataset. Currently its location data is the most comprehensive out there, and quite accurate that it powers location data for many popular services like Apple Maps, Uber, Snapchat, Twitter and many others, and is currently being used by over 100,000 developers, and this number is only growing. The data returned from Foursquare API includes many information about restaurants including latitude, longitude, distance from search point, city, province, complete address, business category etc.</a:t>
+            </a:r>
             <a:endParaRPr lang="en-IN" dirty="0"/>
           </a:p>
         </p:txBody>
       </p:sp>
-      <p:pic>
-        <p:nvPicPr>
-          <p:cNvPr id="6" name="Picture 5">
-            <a:extLst>
-              <a:ext uri="{FF2B5EF4-FFF2-40B4-BE49-F238E27FC236}">
-                <a16:creationId xmlns:a16="http://schemas.microsoft.com/office/drawing/2014/main" id="{AC6EB51C-EDFC-4C30-B72C-BE3708639F93}"/>
-              </a:ext>
-            </a:extLst>
-          </p:cNvPr>
-          <p:cNvPicPr>
-            <a:picLocks noChangeAspect="1"/>
-          </p:cNvPicPr>
-          <p:nvPr/>
-        </p:nvPicPr>
-        <p:blipFill>
-          <a:blip r:embed="rId2"/>
-          <a:stretch>
-            <a:fillRect/>
-          </a:stretch>
-        </p:blipFill>
-        <p:spPr>
-          <a:xfrm>
-            <a:off x="3249228" y="2489862"/>
-            <a:ext cx="4333875" cy="3209925"/>
-          </a:xfrm>
-          <a:prstGeom prst="rect">
-            <a:avLst/>
-          </a:prstGeom>
-        </p:spPr>
-      </p:pic>
     </p:spTree>
     <p:extLst>
       <p:ext uri="{BB962C8B-B14F-4D97-AF65-F5344CB8AC3E}">
@@ -6597,7 +6620,7 @@
           <p:cNvPr id="2" name="Title 1">
             <a:extLst>
               <a:ext uri="{FF2B5EF4-FFF2-40B4-BE49-F238E27FC236}">
-                <a16:creationId xmlns:a16="http://schemas.microsoft.com/office/drawing/2014/main" id="{700E3044-557D-42CA-B76D-4316E8447EDC}"/>
+                <a16:creationId xmlns:a16="http://schemas.microsoft.com/office/drawing/2014/main" id="{0FF31355-5205-4380-87F0-98F6B7337F2D}"/>
               </a:ext>
             </a:extLst>
           </p:cNvPr>
@@ -6611,7 +6634,7 @@
         <p:spPr>
           <a:xfrm>
             <a:off x="646111" y="452718"/>
-            <a:ext cx="9404723" cy="941076"/>
+            <a:ext cx="9404723" cy="896688"/>
           </a:xfrm>
         </p:spPr>
         <p:txBody>
@@ -6627,10 +6650,10 @@
       </p:sp>
       <p:sp>
         <p:nvSpPr>
-          <p:cNvPr id="3" name="Content Placeholder 2">
+          <p:cNvPr id="5" name="Content Placeholder 4">
             <a:extLst>
               <a:ext uri="{FF2B5EF4-FFF2-40B4-BE49-F238E27FC236}">
-                <a16:creationId xmlns:a16="http://schemas.microsoft.com/office/drawing/2014/main" id="{DBE58ABD-456B-4C6D-AC14-8E8E05766AA9}"/>
+                <a16:creationId xmlns:a16="http://schemas.microsoft.com/office/drawing/2014/main" id="{8E703EA9-F309-4127-8255-3197C0164C2B}"/>
               </a:ext>
             </a:extLst>
           </p:cNvPr>
@@ -6643,8 +6666,8 @@
         </p:nvSpPr>
         <p:spPr>
           <a:xfrm>
-            <a:off x="798990" y="1393794"/>
-            <a:ext cx="9250863" cy="5166804"/>
+            <a:off x="807868" y="1349406"/>
+            <a:ext cx="9871969" cy="4898993"/>
           </a:xfrm>
         </p:spPr>
         <p:txBody>
@@ -6655,81 +6678,10 @@
               <a:buNone/>
             </a:pPr>
             <a:r>
-              <a:rPr lang="en-IN" dirty="0"/>
-              <a:t>Data Science has the capability to:</a:t>
-            </a:r>
-          </a:p>
-          <a:p>
-            <a:pPr>
-              <a:buFont typeface="Wingdings" panose="05000000000000000000" pitchFamily="2" charset="2"/>
-              <a:buChar char="à"/>
-            </a:pPr>
-            <a:r>
-              <a:rPr lang="en-IN" dirty="0">
-                <a:sym typeface="Wingdings" panose="05000000000000000000" pitchFamily="2" charset="2"/>
-              </a:rPr>
-              <a:t>Collect and Process the Locations, Neighbourhoods and Venues data.</a:t>
-            </a:r>
-          </a:p>
-          <a:p>
-            <a:pPr>
-              <a:buFont typeface="Wingdings" panose="05000000000000000000" pitchFamily="2" charset="2"/>
-              <a:buChar char="à"/>
-            </a:pPr>
-            <a:r>
-              <a:rPr lang="en-IN" dirty="0">
-                <a:sym typeface="Wingdings" panose="05000000000000000000" pitchFamily="2" charset="2"/>
-              </a:rPr>
-              <a:t>Find the right neighbourhoods in user’s preferred locations.</a:t>
-            </a:r>
-          </a:p>
-          <a:p>
-            <a:pPr>
-              <a:buFont typeface="Wingdings" panose="05000000000000000000" pitchFamily="2" charset="2"/>
-              <a:buChar char="à"/>
-            </a:pPr>
-            <a:r>
-              <a:rPr lang="en-IN" dirty="0">
-                <a:sym typeface="Wingdings" panose="05000000000000000000" pitchFamily="2" charset="2"/>
-              </a:rPr>
-              <a:t>Make sure that all the user requirements are satisfied.</a:t>
-            </a:r>
-          </a:p>
-          <a:p>
-            <a:pPr>
-              <a:buFont typeface="Wingdings" panose="05000000000000000000" pitchFamily="2" charset="2"/>
-              <a:buChar char="à"/>
-            </a:pPr>
-            <a:r>
-              <a:rPr lang="en-IN" dirty="0">
-                <a:sym typeface="Wingdings" panose="05000000000000000000" pitchFamily="2" charset="2"/>
-              </a:rPr>
-              <a:t>Demonstrate the RESULTS to the user with Graphical images and Maps.</a:t>
-            </a:r>
-          </a:p>
-          <a:p>
-            <a:pPr>
-              <a:buFont typeface="Wingdings" panose="05000000000000000000" pitchFamily="2" charset="2"/>
-              <a:buChar char="à"/>
-            </a:pPr>
-            <a:r>
-              <a:rPr lang="en-IN" dirty="0">
-                <a:sym typeface="Wingdings" panose="05000000000000000000" pitchFamily="2" charset="2"/>
-              </a:rPr>
-              <a:t>Suggest the </a:t>
-            </a:r>
-            <a:r>
-              <a:rPr lang="en-IN" b="1" u="sng" dirty="0">
-                <a:sym typeface="Wingdings" panose="05000000000000000000" pitchFamily="2" charset="2"/>
-              </a:rPr>
-              <a:t>best choice</a:t>
-            </a:r>
-            <a:r>
-              <a:rPr lang="en-IN" dirty="0">
-                <a:sym typeface="Wingdings" panose="05000000000000000000" pitchFamily="2" charset="2"/>
-              </a:rPr>
-              <a:t> to rent a house</a:t>
-            </a:r>
+              <a:rPr lang="en-IN" b="1" u="sng" dirty="0"/>
+              <a:t>A Glimpse of Data from Foursquare API:</a:t>
+            </a:r>
+            <a:endParaRPr lang="en-IN" dirty="0"/>
           </a:p>
           <a:p>
             <a:pPr marL="0" indent="0">
@@ -6739,10 +6691,40 @@
           </a:p>
         </p:txBody>
       </p:sp>
+      <p:pic>
+        <p:nvPicPr>
+          <p:cNvPr id="7" name="Picture 6">
+            <a:extLst>
+              <a:ext uri="{FF2B5EF4-FFF2-40B4-BE49-F238E27FC236}">
+                <a16:creationId xmlns:a16="http://schemas.microsoft.com/office/drawing/2014/main" id="{29CE5A30-691A-46FF-A7A5-1105A38A73F8}"/>
+              </a:ext>
+            </a:extLst>
+          </p:cNvPr>
+          <p:cNvPicPr>
+            <a:picLocks noChangeAspect="1"/>
+          </p:cNvPicPr>
+          <p:nvPr/>
+        </p:nvPicPr>
+        <p:blipFill>
+          <a:blip r:embed="rId2"/>
+          <a:stretch>
+            <a:fillRect/>
+          </a:stretch>
+        </p:blipFill>
+        <p:spPr>
+          <a:xfrm>
+            <a:off x="1062314" y="2085651"/>
+            <a:ext cx="9363075" cy="3609975"/>
+          </a:xfrm>
+          <a:prstGeom prst="rect">
+            <a:avLst/>
+          </a:prstGeom>
+        </p:spPr>
+      </p:pic>
     </p:spTree>
     <p:extLst>
       <p:ext uri="{BB962C8B-B14F-4D97-AF65-F5344CB8AC3E}">
-        <p14:creationId xmlns:p14="http://schemas.microsoft.com/office/powerpoint/2010/main" val="1913797874"/>
+        <p14:creationId xmlns:p14="http://schemas.microsoft.com/office/powerpoint/2010/main" val="1693234727"/>
       </p:ext>
     </p:extLst>
   </p:cSld>
@@ -6774,7 +6756,7 @@
           <p:cNvPr id="2" name="Title 1">
             <a:extLst>
               <a:ext uri="{FF2B5EF4-FFF2-40B4-BE49-F238E27FC236}">
-                <a16:creationId xmlns:a16="http://schemas.microsoft.com/office/drawing/2014/main" id="{FEA7902A-A3F2-45D5-9B5E-D29C0DDBC54D}"/>
+                <a16:creationId xmlns:a16="http://schemas.microsoft.com/office/drawing/2014/main" id="{700E3044-557D-42CA-B76D-4316E8447EDC}"/>
               </a:ext>
             </a:extLst>
           </p:cNvPr>
@@ -6788,7 +6770,7 @@
         <p:spPr>
           <a:xfrm>
             <a:off x="646111" y="452718"/>
-            <a:ext cx="9404723" cy="923321"/>
+            <a:ext cx="9404723" cy="941076"/>
           </a:xfrm>
         </p:spPr>
         <p:txBody>
@@ -6807,7 +6789,7 @@
           <p:cNvPr id="3" name="Content Placeholder 2">
             <a:extLst>
               <a:ext uri="{FF2B5EF4-FFF2-40B4-BE49-F238E27FC236}">
-                <a16:creationId xmlns:a16="http://schemas.microsoft.com/office/drawing/2014/main" id="{85EE6AC5-3264-41E4-A896-6299A47988B4}"/>
+                <a16:creationId xmlns:a16="http://schemas.microsoft.com/office/drawing/2014/main" id="{DBE58ABD-456B-4C6D-AC14-8E8E05766AA9}"/>
               </a:ext>
             </a:extLst>
           </p:cNvPr>
@@ -6820,101 +6802,77 @@
         </p:nvSpPr>
         <p:spPr>
           <a:xfrm>
-            <a:off x="843380" y="1447060"/>
-            <a:ext cx="9206474" cy="4801339"/>
-          </a:xfrm>
-        </p:spPr>
-        <p:txBody>
-          <a:bodyPr>
-            <a:normAutofit/>
-          </a:bodyPr>
+            <a:off x="798990" y="1393794"/>
+            <a:ext cx="9250863" cy="5166804"/>
+          </a:xfrm>
+        </p:spPr>
+        <p:txBody>
+          <a:bodyPr/>
           <a:lstStyle/>
           <a:p>
-            <a:pPr marL="0" indent="0" algn="ctr">
+            <a:pPr marL="0" indent="0">
               <a:buNone/>
             </a:pPr>
             <a:r>
-              <a:rPr lang="en-IN" sz="2400" b="1" u="sng" dirty="0"/>
-              <a:t>Tools and Capabilities of Python and Data Science</a:t>
-            </a:r>
-          </a:p>
-          <a:p>
-            <a:pPr>
-              <a:buFont typeface="Wingdings" panose="05000000000000000000" pitchFamily="2" charset="2"/>
-              <a:buChar char="v"/>
+              <a:rPr lang="en-IN" b="1" u="sng" dirty="0"/>
+              <a:t>Approach/Methodology:</a:t>
+            </a:r>
+          </a:p>
+          <a:p>
+            <a:pPr lvl="0"/>
+            <a:r>
+              <a:rPr lang="en-IN" dirty="0"/>
+              <a:t>Get Data from Foursquare API, to get the neighbourhoods of each preferred location. </a:t>
+            </a:r>
+          </a:p>
+          <a:p>
+            <a:pPr lvl="0"/>
+            <a:r>
+              <a:rPr lang="en-IN" dirty="0"/>
+              <a:t>Use plotting libraries to plot each neighbourhood in the map, depicting the spread of preferences in his desired locations.</a:t>
+            </a:r>
+          </a:p>
+          <a:p>
+            <a:pPr lvl="0"/>
+            <a:r>
+              <a:rPr lang="en-IN" dirty="0"/>
+              <a:t>Based on the preferences of </a:t>
+            </a:r>
+            <a:r>
+              <a:rPr lang="en-IN" dirty="0" err="1"/>
+              <a:t>Mr.John</a:t>
+            </a:r>
+            <a:r>
+              <a:rPr lang="en-IN" dirty="0"/>
+              <a:t>, I’ll check if all the conditions are satisfied for his renting.</a:t>
+            </a:r>
+          </a:p>
+          <a:p>
+            <a:pPr lvl="0"/>
+            <a:r>
+              <a:rPr lang="en-IN" dirty="0"/>
+              <a:t>The best ranked location will be the one which has all the conditions met.</a:t>
+            </a:r>
+          </a:p>
+          <a:p>
+            <a:pPr lvl="0"/>
+            <a:r>
+              <a:rPr lang="en-IN" dirty="0"/>
+              <a:t>This top location will be suggested for Mr. John for consideration.</a:t>
+            </a:r>
+          </a:p>
+          <a:p>
+            <a:pPr marL="0" indent="0">
+              <a:buNone/>
             </a:pPr>
-            <a:endParaRPr lang="en-IN" sz="2400" dirty="0"/>
-          </a:p>
-          <a:p>
-            <a:pPr>
-              <a:buFont typeface="Wingdings" panose="05000000000000000000" pitchFamily="2" charset="2"/>
-              <a:buChar char="v"/>
-            </a:pPr>
-            <a:r>
-              <a:rPr lang="en-IN" sz="2400" dirty="0"/>
-              <a:t>Foursquare API – Location Based Service.</a:t>
-            </a:r>
-          </a:p>
-          <a:p>
-            <a:pPr>
-              <a:buFont typeface="Wingdings" panose="05000000000000000000" pitchFamily="2" charset="2"/>
-              <a:buChar char="v"/>
-            </a:pPr>
-            <a:r>
-              <a:rPr lang="en-IN" sz="2400" dirty="0"/>
-              <a:t>Folium – Leaflet Maps.</a:t>
-            </a:r>
-          </a:p>
-          <a:p>
-            <a:pPr>
-              <a:buFont typeface="Wingdings" panose="05000000000000000000" pitchFamily="2" charset="2"/>
-              <a:buChar char="v"/>
-            </a:pPr>
-            <a:r>
-              <a:rPr lang="en-IN" sz="2400" dirty="0"/>
-              <a:t>Pandas – Data Manipulation and Analysis.</a:t>
-            </a:r>
-          </a:p>
-          <a:p>
-            <a:pPr>
-              <a:buFont typeface="Wingdings" panose="05000000000000000000" pitchFamily="2" charset="2"/>
-              <a:buChar char="v"/>
-            </a:pPr>
-            <a:r>
-              <a:rPr lang="en-IN" sz="2400" dirty="0" err="1"/>
-              <a:t>Numpy</a:t>
-            </a:r>
-            <a:r>
-              <a:rPr lang="en-IN" sz="2400" dirty="0"/>
-              <a:t> – Scientific Computing and Mathematics.</a:t>
-            </a:r>
-          </a:p>
-          <a:p>
-            <a:pPr>
-              <a:buFont typeface="Wingdings" panose="05000000000000000000" pitchFamily="2" charset="2"/>
-              <a:buChar char="v"/>
-            </a:pPr>
-            <a:r>
-              <a:rPr lang="en-IN" sz="2400" dirty="0"/>
-              <a:t>Matplotlib – Plotting Library.</a:t>
-            </a:r>
-          </a:p>
-          <a:p>
-            <a:pPr>
-              <a:buFont typeface="Wingdings" panose="05000000000000000000" pitchFamily="2" charset="2"/>
-              <a:buChar char="v"/>
-            </a:pPr>
-            <a:r>
-              <a:rPr lang="en-IN" sz="2400" dirty="0"/>
-              <a:t>Algorithms – To arrive at the right conclusion.</a:t>
-            </a:r>
+            <a:endParaRPr lang="en-IN" dirty="0"/>
           </a:p>
         </p:txBody>
       </p:sp>
     </p:spTree>
     <p:extLst>
       <p:ext uri="{BB962C8B-B14F-4D97-AF65-F5344CB8AC3E}">
-        <p14:creationId xmlns:p14="http://schemas.microsoft.com/office/powerpoint/2010/main" val="1592198346"/>
+        <p14:creationId xmlns:p14="http://schemas.microsoft.com/office/powerpoint/2010/main" val="1913797874"/>
       </p:ext>
     </p:extLst>
   </p:cSld>
@@ -6946,7 +6904,7 @@
           <p:cNvPr id="2" name="Title 1">
             <a:extLst>
               <a:ext uri="{FF2B5EF4-FFF2-40B4-BE49-F238E27FC236}">
-                <a16:creationId xmlns:a16="http://schemas.microsoft.com/office/drawing/2014/main" id="{635591A2-94E1-4987-AB00-2BE744511562}"/>
+                <a16:creationId xmlns:a16="http://schemas.microsoft.com/office/drawing/2014/main" id="{FEA7902A-A3F2-45D5-9B5E-D29C0DDBC54D}"/>
               </a:ext>
             </a:extLst>
           </p:cNvPr>
@@ -6960,7 +6918,7 @@
         <p:spPr>
           <a:xfrm>
             <a:off x="646111" y="452718"/>
-            <a:ext cx="9404723" cy="932199"/>
+            <a:ext cx="9404723" cy="923321"/>
           </a:xfrm>
         </p:spPr>
         <p:txBody>
@@ -6974,194 +6932,112 @@
           </a:p>
         </p:txBody>
       </p:sp>
-      <p:pic>
-        <p:nvPicPr>
-          <p:cNvPr id="4" name="Content Placeholder 3">
+      <p:sp>
+        <p:nvSpPr>
+          <p:cNvPr id="3" name="Content Placeholder 2">
             <a:extLst>
               <a:ext uri="{FF2B5EF4-FFF2-40B4-BE49-F238E27FC236}">
-                <a16:creationId xmlns:a16="http://schemas.microsoft.com/office/drawing/2014/main" id="{D4FBAB09-77B7-42E6-837E-3AEC68AB00FE}"/>
+                <a16:creationId xmlns:a16="http://schemas.microsoft.com/office/drawing/2014/main" id="{85EE6AC5-3264-41E4-A896-6299A47988B4}"/>
               </a:ext>
             </a:extLst>
           </p:cNvPr>
-          <p:cNvPicPr>
-            <a:picLocks noGrp="1"/>
-          </p:cNvPicPr>
+          <p:cNvSpPr>
+            <a:spLocks noGrp="1"/>
+          </p:cNvSpPr>
           <p:nvPr>
             <p:ph idx="1"/>
           </p:nvPr>
-        </p:nvPicPr>
-        <p:blipFill>
-          <a:blip r:embed="rId2"/>
-          <a:stretch>
-            <a:fillRect/>
-          </a:stretch>
-        </p:blipFill>
+        </p:nvSpPr>
         <p:spPr>
           <a:xfrm>
-            <a:off x="6096000" y="2166152"/>
-            <a:ext cx="5548543" cy="3878062"/>
-          </a:xfrm>
-          <a:prstGeom prst="rect">
-            <a:avLst/>
-          </a:prstGeom>
-        </p:spPr>
-      </p:pic>
-      <p:sp>
-        <p:nvSpPr>
-          <p:cNvPr id="5" name="TextBox 4">
-            <a:extLst>
-              <a:ext uri="{FF2B5EF4-FFF2-40B4-BE49-F238E27FC236}">
-                <a16:creationId xmlns:a16="http://schemas.microsoft.com/office/drawing/2014/main" id="{AC1B0605-93D6-4001-B7A3-89A30F14A16E}"/>
-              </a:ext>
-            </a:extLst>
-          </p:cNvPr>
-          <p:cNvSpPr txBox="1"/>
-          <p:nvPr/>
-        </p:nvSpPr>
-        <p:spPr>
-          <a:xfrm>
-            <a:off x="878889" y="1384917"/>
-            <a:ext cx="5051394" cy="5632311"/>
-          </a:xfrm>
-          <a:prstGeom prst="rect">
-            <a:avLst/>
-          </a:prstGeom>
-          <a:noFill/>
-        </p:spPr>
-        <p:txBody>
-          <a:bodyPr wrap="square" rtlCol="0">
-            <a:spAutoFit/>
+            <a:off x="843380" y="1447060"/>
+            <a:ext cx="9206474" cy="4801339"/>
+          </a:xfrm>
+        </p:spPr>
+        <p:txBody>
+          <a:bodyPr>
+            <a:normAutofit/>
           </a:bodyPr>
           <a:lstStyle/>
           <a:p>
-            <a:r>
-              <a:rPr lang="en-IN" dirty="0"/>
-              <a:t>How to Suggest the best location to rent out ?</a:t>
-            </a:r>
-          </a:p>
-          <a:p>
-            <a:pPr marL="342900" indent="-342900">
-              <a:buAutoNum type="arabicParenR"/>
+            <a:pPr marL="0" indent="0" algn="ctr">
+              <a:buNone/>
             </a:pPr>
             <a:r>
-              <a:rPr lang="en-IN" dirty="0"/>
-              <a:t>Get the Latitudes and Longitudes of preferred locations, which are:</a:t>
-            </a:r>
-          </a:p>
-          <a:p>
-            <a:pPr marL="800100" lvl="1" indent="-342900">
-              <a:buAutoNum type="arabicParenR"/>
+              <a:rPr lang="en-IN" sz="2400" b="1" u="sng" dirty="0"/>
+              <a:t>Tools and Capabilities of Python and Data Science</a:t>
+            </a:r>
+          </a:p>
+          <a:p>
+            <a:pPr>
+              <a:buFont typeface="Wingdings" panose="05000000000000000000" pitchFamily="2" charset="2"/>
+              <a:buChar char="v"/>
             </a:pPr>
             <a:r>
-              <a:rPr lang="en-IN" dirty="0"/>
-              <a:t>Yelahanka</a:t>
-            </a:r>
-          </a:p>
-          <a:p>
-            <a:pPr marL="800100" lvl="1" indent="-342900">
-              <a:buAutoNum type="arabicParenR"/>
+              <a:rPr lang="en-IN" sz="2400" dirty="0"/>
+              <a:t>Foursquare API – Location Based Service.</a:t>
+            </a:r>
+          </a:p>
+          <a:p>
+            <a:pPr>
+              <a:buFont typeface="Wingdings" panose="05000000000000000000" pitchFamily="2" charset="2"/>
+              <a:buChar char="v"/>
             </a:pPr>
             <a:r>
-              <a:rPr lang="en-IN" dirty="0"/>
-              <a:t>Hebbal</a:t>
-            </a:r>
-          </a:p>
-          <a:p>
-            <a:pPr marL="800100" lvl="1" indent="-342900">
-              <a:buAutoNum type="arabicParenR"/>
+              <a:rPr lang="en-IN" sz="2400" dirty="0"/>
+              <a:t>Folium – Leaflet Maps.</a:t>
+            </a:r>
+          </a:p>
+          <a:p>
+            <a:pPr>
+              <a:buFont typeface="Wingdings" panose="05000000000000000000" pitchFamily="2" charset="2"/>
+              <a:buChar char="v"/>
             </a:pPr>
             <a:r>
-              <a:rPr lang="en-IN" dirty="0"/>
-              <a:t>Banashankari</a:t>
-            </a:r>
-          </a:p>
-          <a:p>
-            <a:pPr marL="800100" lvl="1" indent="-342900">
-              <a:buAutoNum type="arabicParenR"/>
+              <a:rPr lang="en-IN" sz="2400" dirty="0"/>
+              <a:t>Pandas – Data Manipulation and Analysis.</a:t>
+            </a:r>
+          </a:p>
+          <a:p>
+            <a:pPr>
+              <a:buFont typeface="Wingdings" panose="05000000000000000000" pitchFamily="2" charset="2"/>
+              <a:buChar char="v"/>
             </a:pPr>
             <a:r>
-              <a:rPr lang="en-IN" dirty="0"/>
-              <a:t>Whitefield</a:t>
-            </a:r>
-          </a:p>
-          <a:p>
-            <a:pPr marL="342900" indent="-342900">
-              <a:buAutoNum type="arabicParenR"/>
+              <a:rPr lang="en-IN" sz="2400" dirty="0" err="1"/>
+              <a:t>Numpy</a:t>
+            </a:r>
+            <a:r>
+              <a:rPr lang="en-IN" sz="2400" dirty="0"/>
+              <a:t> – Scientific Computing and Mathematics.</a:t>
+            </a:r>
+          </a:p>
+          <a:p>
+            <a:pPr>
+              <a:buFont typeface="Wingdings" panose="05000000000000000000" pitchFamily="2" charset="2"/>
+              <a:buChar char="v"/>
             </a:pPr>
             <a:r>
-              <a:rPr lang="en-IN" dirty="0"/>
-              <a:t>Get the neighbourhoods of these locations.</a:t>
-            </a:r>
-          </a:p>
-          <a:p>
-            <a:pPr marL="342900" indent="-342900">
-              <a:buAutoNum type="arabicParenR"/>
+              <a:rPr lang="en-IN" sz="2400" dirty="0"/>
+              <a:t>Matplotlib – Plotting Library.</a:t>
+            </a:r>
+          </a:p>
+          <a:p>
+            <a:pPr>
+              <a:buFont typeface="Wingdings" panose="05000000000000000000" pitchFamily="2" charset="2"/>
+              <a:buChar char="v"/>
             </a:pPr>
             <a:r>
-              <a:rPr lang="en-IN" dirty="0"/>
-              <a:t>Get the nearby Venues and their Categories.</a:t>
-            </a:r>
-          </a:p>
-          <a:p>
-            <a:pPr marL="342900" indent="-342900">
-              <a:buAutoNum type="arabicParenR"/>
-            </a:pPr>
-            <a:r>
-              <a:rPr lang="en-IN" dirty="0"/>
-              <a:t>Filter out any unwanted Venue, which user is not looking for.</a:t>
-            </a:r>
-          </a:p>
-          <a:p>
-            <a:pPr marL="342900" indent="-342900">
-              <a:buFontTx/>
-              <a:buAutoNum type="arabicParenR"/>
-            </a:pPr>
-            <a:r>
-              <a:rPr lang="en-IN" dirty="0"/>
-              <a:t>Plot them on a Map for Visualization.</a:t>
-            </a:r>
-          </a:p>
-          <a:p>
-            <a:pPr marL="342900" indent="-342900">
-              <a:buAutoNum type="arabicParenR"/>
-            </a:pPr>
-            <a:r>
-              <a:rPr lang="en-IN" dirty="0"/>
-              <a:t>Make sure that all the preferences of the user has satisfied.</a:t>
-            </a:r>
-          </a:p>
-          <a:p>
-            <a:pPr marL="342900" indent="-342900">
-              <a:buAutoNum type="arabicParenR"/>
-            </a:pPr>
-            <a:r>
-              <a:rPr lang="en-IN" dirty="0"/>
-              <a:t>Suggest the </a:t>
-            </a:r>
-            <a:r>
-              <a:rPr lang="en-IN" b="1" dirty="0"/>
-              <a:t>best</a:t>
-            </a:r>
-            <a:r>
-              <a:rPr lang="en-IN" dirty="0"/>
-              <a:t> Location to Rent !!</a:t>
-            </a:r>
-          </a:p>
-          <a:p>
-            <a:endParaRPr lang="en-IN" dirty="0"/>
-          </a:p>
-          <a:p>
-            <a:pPr marL="342900" indent="-342900">
-              <a:buAutoNum type="arabicParenR"/>
-            </a:pPr>
-            <a:endParaRPr lang="en-IN" dirty="0"/>
+              <a:rPr lang="en-IN" sz="2400" dirty="0"/>
+              <a:t>Algorithms – To arrive at the right conclusion.</a:t>
+            </a:r>
           </a:p>
         </p:txBody>
       </p:sp>
     </p:spTree>
     <p:extLst>
       <p:ext uri="{BB962C8B-B14F-4D97-AF65-F5344CB8AC3E}">
-        <p14:creationId xmlns:p14="http://schemas.microsoft.com/office/powerpoint/2010/main" val="947506338"/>
+        <p14:creationId xmlns:p14="http://schemas.microsoft.com/office/powerpoint/2010/main" val="1592198346"/>
       </p:ext>
     </p:extLst>
   </p:cSld>
@@ -7193,6 +7069,251 @@
           <p:cNvPr id="2" name="Title 1">
             <a:extLst>
               <a:ext uri="{FF2B5EF4-FFF2-40B4-BE49-F238E27FC236}">
+                <a16:creationId xmlns:a16="http://schemas.microsoft.com/office/drawing/2014/main" id="{635591A2-94E1-4987-AB00-2BE744511562}"/>
+              </a:ext>
+            </a:extLst>
+          </p:cNvPr>
+          <p:cNvSpPr>
+            <a:spLocks noGrp="1"/>
+          </p:cNvSpPr>
+          <p:nvPr>
+            <p:ph type="title"/>
+          </p:nvPr>
+        </p:nvSpPr>
+        <p:spPr>
+          <a:xfrm>
+            <a:off x="646111" y="452718"/>
+            <a:ext cx="9404723" cy="932199"/>
+          </a:xfrm>
+        </p:spPr>
+        <p:txBody>
+          <a:bodyPr/>
+          <a:lstStyle/>
+          <a:p>
+            <a:r>
+              <a:rPr lang="en-IN" dirty="0"/>
+              <a:t>Capstone Project – Rent a House</a:t>
+            </a:r>
+          </a:p>
+        </p:txBody>
+      </p:sp>
+      <p:pic>
+        <p:nvPicPr>
+          <p:cNvPr id="4" name="Content Placeholder 3">
+            <a:extLst>
+              <a:ext uri="{FF2B5EF4-FFF2-40B4-BE49-F238E27FC236}">
+                <a16:creationId xmlns:a16="http://schemas.microsoft.com/office/drawing/2014/main" id="{D4FBAB09-77B7-42E6-837E-3AEC68AB00FE}"/>
+              </a:ext>
+            </a:extLst>
+          </p:cNvPr>
+          <p:cNvPicPr>
+            <a:picLocks noGrp="1"/>
+          </p:cNvPicPr>
+          <p:nvPr>
+            <p:ph idx="1"/>
+          </p:nvPr>
+        </p:nvPicPr>
+        <p:blipFill>
+          <a:blip r:embed="rId2"/>
+          <a:stretch>
+            <a:fillRect/>
+          </a:stretch>
+        </p:blipFill>
+        <p:spPr>
+          <a:xfrm>
+            <a:off x="6096000" y="2166152"/>
+            <a:ext cx="5548543" cy="3878062"/>
+          </a:xfrm>
+          <a:prstGeom prst="rect">
+            <a:avLst/>
+          </a:prstGeom>
+        </p:spPr>
+      </p:pic>
+      <p:sp>
+        <p:nvSpPr>
+          <p:cNvPr id="5" name="TextBox 4">
+            <a:extLst>
+              <a:ext uri="{FF2B5EF4-FFF2-40B4-BE49-F238E27FC236}">
+                <a16:creationId xmlns:a16="http://schemas.microsoft.com/office/drawing/2014/main" id="{AC1B0605-93D6-4001-B7A3-89A30F14A16E}"/>
+              </a:ext>
+            </a:extLst>
+          </p:cNvPr>
+          <p:cNvSpPr txBox="1"/>
+          <p:nvPr/>
+        </p:nvSpPr>
+        <p:spPr>
+          <a:xfrm>
+            <a:off x="745724" y="1384917"/>
+            <a:ext cx="5350276" cy="5355312"/>
+          </a:xfrm>
+          <a:prstGeom prst="rect">
+            <a:avLst/>
+          </a:prstGeom>
+          <a:noFill/>
+        </p:spPr>
+        <p:txBody>
+          <a:bodyPr wrap="square" rtlCol="0">
+            <a:spAutoFit/>
+          </a:bodyPr>
+          <a:lstStyle/>
+          <a:p>
+            <a:r>
+              <a:rPr lang="en-IN" dirty="0"/>
+              <a:t>How to Suggest the best location to rent out ?</a:t>
+            </a:r>
+          </a:p>
+          <a:p>
+            <a:endParaRPr lang="en-IN" dirty="0"/>
+          </a:p>
+          <a:p>
+            <a:pPr marL="342900" indent="-342900">
+              <a:buFont typeface="+mj-lt"/>
+              <a:buAutoNum type="arabicPeriod"/>
+            </a:pPr>
+            <a:r>
+              <a:rPr lang="en-IN" dirty="0"/>
+              <a:t>Get the Latitudes and Longitudes of preferred locations. </a:t>
+            </a:r>
+          </a:p>
+          <a:p>
+            <a:pPr marL="342900" indent="-342900">
+              <a:buFont typeface="+mj-lt"/>
+              <a:buAutoNum type="arabicPeriod"/>
+            </a:pPr>
+            <a:endParaRPr lang="en-IN" dirty="0"/>
+          </a:p>
+          <a:p>
+            <a:pPr marL="342900" indent="-342900">
+              <a:buFont typeface="+mj-lt"/>
+              <a:buAutoNum type="arabicPeriod"/>
+            </a:pPr>
+            <a:r>
+              <a:rPr lang="en-IN" dirty="0"/>
+              <a:t>Get the neighbourhoods and Venues of these locations. </a:t>
+            </a:r>
+          </a:p>
+          <a:p>
+            <a:pPr marL="342900" indent="-342900">
+              <a:buFont typeface="+mj-lt"/>
+              <a:buAutoNum type="arabicPeriod"/>
+            </a:pPr>
+            <a:endParaRPr lang="en-IN" dirty="0"/>
+          </a:p>
+          <a:p>
+            <a:pPr marL="342900" indent="-342900">
+              <a:buFont typeface="+mj-lt"/>
+              <a:buAutoNum type="arabicPeriod"/>
+            </a:pPr>
+            <a:r>
+              <a:rPr lang="en-IN" dirty="0"/>
+              <a:t>Filter out any unwanted Venue, which the user is not looking for.</a:t>
+            </a:r>
+          </a:p>
+          <a:p>
+            <a:pPr marL="342900" indent="-342900">
+              <a:buFont typeface="+mj-lt"/>
+              <a:buAutoNum type="arabicPeriod"/>
+            </a:pPr>
+            <a:endParaRPr lang="en-IN" dirty="0"/>
+          </a:p>
+          <a:p>
+            <a:pPr marL="342900" indent="-342900">
+              <a:buFont typeface="+mj-lt"/>
+              <a:buAutoNum type="arabicPeriod"/>
+            </a:pPr>
+            <a:r>
+              <a:rPr lang="en-IN" dirty="0"/>
+              <a:t>Plot them on a Map for Visualization.</a:t>
+            </a:r>
+          </a:p>
+          <a:p>
+            <a:pPr marL="342900" indent="-342900">
+              <a:buFont typeface="+mj-lt"/>
+              <a:buAutoNum type="arabicPeriod"/>
+            </a:pPr>
+            <a:endParaRPr lang="en-IN" dirty="0"/>
+          </a:p>
+          <a:p>
+            <a:pPr marL="342900" indent="-342900">
+              <a:buFont typeface="+mj-lt"/>
+              <a:buAutoNum type="arabicPeriod"/>
+            </a:pPr>
+            <a:r>
+              <a:rPr lang="en-IN" dirty="0"/>
+              <a:t>Make sure that all the preferences of the user has satisfied.</a:t>
+            </a:r>
+          </a:p>
+          <a:p>
+            <a:pPr marL="342900" indent="-342900">
+              <a:buFont typeface="+mj-lt"/>
+              <a:buAutoNum type="arabicPeriod"/>
+            </a:pPr>
+            <a:endParaRPr lang="en-IN" dirty="0"/>
+          </a:p>
+          <a:p>
+            <a:pPr marL="342900" indent="-342900">
+              <a:buFont typeface="+mj-lt"/>
+              <a:buAutoNum type="arabicPeriod"/>
+            </a:pPr>
+            <a:r>
+              <a:rPr lang="en-IN" dirty="0"/>
+              <a:t>Suggest the </a:t>
+            </a:r>
+            <a:r>
+              <a:rPr lang="en-IN" b="1" dirty="0"/>
+              <a:t>best</a:t>
+            </a:r>
+            <a:r>
+              <a:rPr lang="en-IN" dirty="0"/>
+              <a:t> Location to Rent !!</a:t>
+            </a:r>
+          </a:p>
+          <a:p>
+            <a:endParaRPr lang="en-IN" dirty="0"/>
+          </a:p>
+          <a:p>
+            <a:pPr marL="342900" indent="-342900">
+              <a:buAutoNum type="arabicParenR"/>
+            </a:pPr>
+            <a:endParaRPr lang="en-IN" dirty="0"/>
+          </a:p>
+        </p:txBody>
+      </p:sp>
+    </p:spTree>
+    <p:extLst>
+      <p:ext uri="{BB962C8B-B14F-4D97-AF65-F5344CB8AC3E}">
+        <p14:creationId xmlns:p14="http://schemas.microsoft.com/office/powerpoint/2010/main" val="947506338"/>
+      </p:ext>
+    </p:extLst>
+  </p:cSld>
+  <p:clrMapOvr>
+    <a:masterClrMapping/>
+  </p:clrMapOvr>
+</p:sld>
+</file>
+
+<file path=ppt/slides/slide8.xml><?xml version="1.0" encoding="utf-8"?>
+<p:sld xmlns:a="http://schemas.openxmlformats.org/drawingml/2006/main" xmlns:r="http://schemas.openxmlformats.org/officeDocument/2006/relationships" xmlns:p="http://schemas.openxmlformats.org/presentationml/2006/main">
+  <p:cSld>
+    <p:spTree>
+      <p:nvGrpSpPr>
+        <p:cNvPr id="1" name=""/>
+        <p:cNvGrpSpPr/>
+        <p:nvPr/>
+      </p:nvGrpSpPr>
+      <p:grpSpPr>
+        <a:xfrm>
+          <a:off x="0" y="0"/>
+          <a:ext cx="0" cy="0"/>
+          <a:chOff x="0" y="0"/>
+          <a:chExt cx="0" cy="0"/>
+        </a:xfrm>
+      </p:grpSpPr>
+      <p:sp>
+        <p:nvSpPr>
+          <p:cNvPr id="2" name="Title 1">
+            <a:extLst>
+              <a:ext uri="{FF2B5EF4-FFF2-40B4-BE49-F238E27FC236}">
                 <a16:creationId xmlns:a16="http://schemas.microsoft.com/office/drawing/2014/main" id="{3CD302F5-F1EC-43AC-93CB-5A7D35E85798}"/>
               </a:ext>
             </a:extLst>
@@ -7244,15 +7365,21 @@
           </a:xfrm>
         </p:spPr>
         <p:txBody>
-          <a:bodyPr/>
+          <a:bodyPr>
+            <a:normAutofit/>
+          </a:bodyPr>
           <a:lstStyle/>
           <a:p>
             <a:pPr marL="0" indent="0">
               <a:buNone/>
             </a:pPr>
             <a:r>
+              <a:rPr lang="en-IN" b="1" u="sng" dirty="0"/>
+              <a:t>Conclusions</a:t>
+            </a:r>
+            <a:r>
               <a:rPr lang="en-IN" u="sng" dirty="0"/>
-              <a:t>Conclusion:</a:t>
+              <a:t>:</a:t>
             </a:r>
           </a:p>
           <a:p>
@@ -7260,8 +7387,14 @@
               <a:buNone/>
             </a:pPr>
             <a:r>
+              <a:rPr lang="en-IN" dirty="0">
+                <a:sym typeface="Wingdings" panose="05000000000000000000" pitchFamily="2" charset="2"/>
+              </a:rPr>
+              <a:t> From the map and Venues returned by Foursquare API, we can conclude that r</a:t>
+            </a:r>
+            <a:r>
               <a:rPr lang="en-IN" dirty="0"/>
-              <a:t>Rent a House in “Hebbal” as it has all the preferences, which user is looking for !!</a:t>
+              <a:t>enting a House in “Hebbal” will be the best option, as it has all the preferences, which user is looking for !!</a:t>
             </a:r>
           </a:p>
           <a:p>
@@ -7299,8 +7432,12 @@
               <a:buNone/>
             </a:pPr>
             <a:r>
+              <a:rPr lang="en-IN" b="1" u="sng" dirty="0"/>
+              <a:t>Result</a:t>
+            </a:r>
+            <a:r>
               <a:rPr lang="en-IN" u="sng" dirty="0"/>
-              <a:t>Result:</a:t>
+              <a:t>:</a:t>
             </a:r>
             <a:r>
               <a:rPr lang="en-IN" dirty="0"/>
@@ -7312,8 +7449,12 @@
               <a:buNone/>
             </a:pPr>
             <a:r>
+              <a:rPr lang="en-IN" dirty="0"/>
+              <a:t>The logic and approach was able to arrive at best location which can be Rented by the user. </a:t>
+            </a:r>
+            <a:r>
               <a:rPr lang="en-IN" sz="2800" dirty="0"/>
-              <a:t>Happy users !!</a:t>
+              <a:t> </a:t>
             </a:r>
           </a:p>
           <a:p>
@@ -7324,45 +7465,6 @@
           </a:p>
         </p:txBody>
       </p:sp>
-      <p:pic>
-        <p:nvPicPr>
-          <p:cNvPr id="4" name="Picture 3">
-            <a:extLst>
-              <a:ext uri="{FF2B5EF4-FFF2-40B4-BE49-F238E27FC236}">
-                <a16:creationId xmlns:a16="http://schemas.microsoft.com/office/drawing/2014/main" id="{0ABEC400-007E-4DC3-838D-8D281F34A697}"/>
-              </a:ext>
-            </a:extLst>
-          </p:cNvPr>
-          <p:cNvPicPr>
-            <a:picLocks noChangeAspect="1"/>
-          </p:cNvPicPr>
-          <p:nvPr/>
-        </p:nvPicPr>
-        <p:blipFill>
-          <a:blip r:embed="rId2">
-            <a:extLst>
-              <a:ext uri="{28A0092B-C50C-407E-A947-70E740481C1C}">
-                <a14:useLocalDpi xmlns:a14="http://schemas.microsoft.com/office/drawing/2010/main" val="0"/>
-              </a:ext>
-              <a:ext uri="{837473B0-CC2E-450A-ABE3-18F120FF3D39}">
-                <a1611:picAttrSrcUrl xmlns:a1611="http://schemas.microsoft.com/office/drawing/2016/11/main" r:id="rId3"/>
-              </a:ext>
-            </a:extLst>
-          </a:blip>
-          <a:stretch>
-            <a:fillRect/>
-          </a:stretch>
-        </p:blipFill>
-        <p:spPr>
-          <a:xfrm>
-            <a:off x="4234034" y="4565548"/>
-            <a:ext cx="2565646" cy="1682851"/>
-          </a:xfrm>
-          <a:prstGeom prst="rect">
-            <a:avLst/>
-          </a:prstGeom>
-        </p:spPr>
-      </p:pic>
       <p:pic>
         <p:nvPicPr>
           <p:cNvPr id="5" name="Picture 4">
@@ -7376,14 +7478,14 @@
           <p:nvPr/>
         </p:nvPicPr>
         <p:blipFill>
-          <a:blip r:embed="rId4"/>
+          <a:blip r:embed="rId2"/>
           <a:stretch>
             <a:fillRect/>
           </a:stretch>
         </p:blipFill>
         <p:spPr>
           <a:xfrm>
-            <a:off x="2679829" y="2399293"/>
+            <a:off x="2614025" y="2953038"/>
             <a:ext cx="5674057" cy="1682850"/>
           </a:xfrm>
           <a:prstGeom prst="rect">

</xml_diff>